<commit_message>
Tweaked the three example diagrams
(1) EKS example:
* I used the short name for CloudWatch to match the other labels.
* I deleted the internet gateway since we rarely use this icon any more.

(2) Three-tier example:
* I moved up the VPC box's bottom edge so that the Availability Zone boxes extend below it as usual.
* I used the short name for Route 53 to match the other labels.
* I blurred the second instance icon to keep people from picking **Photocopy** or some other effect.
* I deleted the internet gateway.

(3) Serverless example:
* I used the short names for SageMaker and API Gateway to match the other labels.
</commit_message>
<xml_diff>
--- a/doc/eks-architecture-examples/nvidia-cheminformatics-architecture-diagram.pptx
+++ b/doc/eks-architecture-examples/nvidia-cheminformatics-architecture-diagram.pptx
@@ -243,7 +243,7 @@
           <a:p>
             <a:fld id="{10EEF6A4-9017-AA41-B724-716C121CC8DF}" type="datetimeFigureOut">
               <a:rPr lang="en-US" smtClean="0"/>
-              <a:t>6/30/2022</a:t>
+              <a:t>8/5/2022</a:t>
             </a:fld>
             <a:endParaRPr lang="en-US"/>
           </a:p>
@@ -413,7 +413,7 @@
           <a:p>
             <a:fld id="{10EEF6A4-9017-AA41-B724-716C121CC8DF}" type="datetimeFigureOut">
               <a:rPr lang="en-US" smtClean="0"/>
-              <a:t>6/30/2022</a:t>
+              <a:t>8/5/2022</a:t>
             </a:fld>
             <a:endParaRPr lang="en-US"/>
           </a:p>
@@ -593,7 +593,7 @@
           <a:p>
             <a:fld id="{10EEF6A4-9017-AA41-B724-716C121CC8DF}" type="datetimeFigureOut">
               <a:rPr lang="en-US" smtClean="0"/>
-              <a:t>6/30/2022</a:t>
+              <a:t>8/5/2022</a:t>
             </a:fld>
             <a:endParaRPr lang="en-US"/>
           </a:p>
@@ -763,7 +763,7 @@
           <a:p>
             <a:fld id="{10EEF6A4-9017-AA41-B724-716C121CC8DF}" type="datetimeFigureOut">
               <a:rPr lang="en-US" smtClean="0"/>
-              <a:t>6/30/2022</a:t>
+              <a:t>8/5/2022</a:t>
             </a:fld>
             <a:endParaRPr lang="en-US"/>
           </a:p>
@@ -1007,7 +1007,7 @@
           <a:p>
             <a:fld id="{10EEF6A4-9017-AA41-B724-716C121CC8DF}" type="datetimeFigureOut">
               <a:rPr lang="en-US" smtClean="0"/>
-              <a:t>6/30/2022</a:t>
+              <a:t>8/5/2022</a:t>
             </a:fld>
             <a:endParaRPr lang="en-US"/>
           </a:p>
@@ -1239,7 +1239,7 @@
           <a:p>
             <a:fld id="{10EEF6A4-9017-AA41-B724-716C121CC8DF}" type="datetimeFigureOut">
               <a:rPr lang="en-US" smtClean="0"/>
-              <a:t>6/30/2022</a:t>
+              <a:t>8/5/2022</a:t>
             </a:fld>
             <a:endParaRPr lang="en-US"/>
           </a:p>
@@ -1606,7 +1606,7 @@
           <a:p>
             <a:fld id="{10EEF6A4-9017-AA41-B724-716C121CC8DF}" type="datetimeFigureOut">
               <a:rPr lang="en-US" smtClean="0"/>
-              <a:t>6/30/2022</a:t>
+              <a:t>8/5/2022</a:t>
             </a:fld>
             <a:endParaRPr lang="en-US"/>
           </a:p>
@@ -1724,7 +1724,7 @@
           <a:p>
             <a:fld id="{10EEF6A4-9017-AA41-B724-716C121CC8DF}" type="datetimeFigureOut">
               <a:rPr lang="en-US" smtClean="0"/>
-              <a:t>6/30/2022</a:t>
+              <a:t>8/5/2022</a:t>
             </a:fld>
             <a:endParaRPr lang="en-US"/>
           </a:p>
@@ -1819,7 +1819,7 @@
           <a:p>
             <a:fld id="{10EEF6A4-9017-AA41-B724-716C121CC8DF}" type="datetimeFigureOut">
               <a:rPr lang="en-US" smtClean="0"/>
-              <a:t>6/30/2022</a:t>
+              <a:t>8/5/2022</a:t>
             </a:fld>
             <a:endParaRPr lang="en-US"/>
           </a:p>
@@ -2096,7 +2096,7 @@
           <a:p>
             <a:fld id="{10EEF6A4-9017-AA41-B724-716C121CC8DF}" type="datetimeFigureOut">
               <a:rPr lang="en-US" smtClean="0"/>
-              <a:t>6/30/2022</a:t>
+              <a:t>8/5/2022</a:t>
             </a:fld>
             <a:endParaRPr lang="en-US"/>
           </a:p>
@@ -2353,7 +2353,7 @@
           <a:p>
             <a:fld id="{10EEF6A4-9017-AA41-B724-716C121CC8DF}" type="datetimeFigureOut">
               <a:rPr lang="en-US" smtClean="0"/>
-              <a:t>6/30/2022</a:t>
+              <a:t>8/5/2022</a:t>
             </a:fld>
             <a:endParaRPr lang="en-US"/>
           </a:p>
@@ -2566,7 +2566,7 @@
           <a:p>
             <a:fld id="{10EEF6A4-9017-AA41-B724-716C121CC8DF}" type="datetimeFigureOut">
               <a:rPr lang="en-US" smtClean="0"/>
-              <a:t>6/30/2022</a:t>
+              <a:t>8/5/2022</a:t>
             </a:fld>
             <a:endParaRPr lang="en-US"/>
           </a:p>
@@ -2985,8 +2985,8 @@
         </p:nvSpPr>
         <p:spPr>
           <a:xfrm>
-            <a:off x="6309360" y="4206240"/>
-            <a:ext cx="3017520" cy="6858000"/>
+            <a:off x="6227354" y="4206240"/>
+            <a:ext cx="2842764" cy="6614160"/>
           </a:xfrm>
           <a:prstGeom prst="rect">
             <a:avLst/>
@@ -3056,8 +3056,8 @@
         </p:nvSpPr>
         <p:spPr>
           <a:xfrm>
-            <a:off x="5394960" y="4572000"/>
-            <a:ext cx="9418320" cy="6217920"/>
+            <a:off x="5299710" y="4572000"/>
+            <a:ext cx="8732521" cy="6096000"/>
           </a:xfrm>
           <a:prstGeom prst="rect">
             <a:avLst/>
@@ -3134,7 +3134,7 @@
         </p:blipFill>
         <p:spPr>
           <a:xfrm>
-            <a:off x="5394960" y="4572000"/>
+            <a:off x="5299710" y="4572000"/>
             <a:ext cx="381000" cy="381000"/>
           </a:xfrm>
           <a:prstGeom prst="rect">
@@ -3156,7 +3156,7 @@
         </p:nvSpPr>
         <p:spPr>
           <a:xfrm>
-            <a:off x="6583680" y="4846320"/>
+            <a:off x="6431280" y="4846320"/>
             <a:ext cx="2468880" cy="1337999"/>
           </a:xfrm>
           <a:prstGeom prst="rect">
@@ -3236,7 +3236,7 @@
         </p:blipFill>
         <p:spPr>
           <a:xfrm>
-            <a:off x="6583680" y="4846320"/>
+            <a:off x="6431280" y="4846320"/>
             <a:ext cx="381000" cy="381000"/>
           </a:xfrm>
           <a:prstGeom prst="rect">
@@ -3258,7 +3258,7 @@
         </p:nvSpPr>
         <p:spPr>
           <a:xfrm>
-            <a:off x="6583680" y="6492240"/>
+            <a:off x="6431280" y="6492240"/>
             <a:ext cx="2468880" cy="4023360"/>
           </a:xfrm>
           <a:prstGeom prst="rect">
@@ -3338,7 +3338,7 @@
         </p:blipFill>
         <p:spPr>
           <a:xfrm>
-            <a:off x="6583680" y="6492240"/>
+            <a:off x="6431280" y="6492240"/>
             <a:ext cx="381000" cy="381000"/>
           </a:xfrm>
           <a:prstGeom prst="rect">
@@ -3348,10 +3348,10 @@
       </p:pic>
       <p:sp>
         <p:nvSpPr>
-          <p:cNvPr id="25" name="TextBox 24">
+          <p:cNvPr id="27" name="TextBox 26">
             <a:extLst>
               <a:ext uri="{FF2B5EF4-FFF2-40B4-BE49-F238E27FC236}">
-                <a16:creationId xmlns:a16="http://schemas.microsoft.com/office/drawing/2014/main" id="{0731C086-7823-F749-A565-A5DBA54CDA08}"/>
+                <a16:creationId xmlns:a16="http://schemas.microsoft.com/office/drawing/2014/main" id="{47E02198-0CCF-7541-B17A-5122EEA25651}"/>
               </a:ext>
             </a:extLst>
           </p:cNvPr>
@@ -3360,46 +3360,7 @@
         </p:nvSpPr>
         <p:spPr>
           <a:xfrm>
-            <a:off x="9556126" y="4806315"/>
-            <a:ext cx="1280160" cy="274320"/>
-          </a:xfrm>
-          <a:prstGeom prst="rect">
-            <a:avLst/>
-          </a:prstGeom>
-          <a:noFill/>
-        </p:spPr>
-        <p:txBody>
-          <a:bodyPr wrap="square" rtlCol="0">
-            <a:spAutoFit/>
-          </a:bodyPr>
-          <a:lstStyle/>
-          <a:p>
-            <a:pPr algn="ctr"/>
-            <a:r>
-              <a:rPr lang="en-US" sz="1100" dirty="0">
-                <a:latin typeface="Arial" panose="020B0604020202020204" pitchFamily="34" charset="0"/>
-                <a:cs typeface="Arial" panose="020B0604020202020204" pitchFamily="34" charset="0"/>
-              </a:rPr>
-              <a:t>Internet gateway</a:t>
-            </a:r>
-          </a:p>
-        </p:txBody>
-      </p:sp>
-      <p:sp>
-        <p:nvSpPr>
-          <p:cNvPr id="27" name="TextBox 26">
-            <a:extLst>
-              <a:ext uri="{FF2B5EF4-FFF2-40B4-BE49-F238E27FC236}">
-                <a16:creationId xmlns:a16="http://schemas.microsoft.com/office/drawing/2014/main" id="{47E02198-0CCF-7541-B17A-5122EEA25651}"/>
-              </a:ext>
-            </a:extLst>
-          </p:cNvPr>
-          <p:cNvSpPr txBox="1"/>
-          <p:nvPr/>
-        </p:nvSpPr>
-        <p:spPr>
-          <a:xfrm>
-            <a:off x="6935379" y="5762482"/>
+            <a:off x="6782979" y="5762482"/>
             <a:ext cx="1769070" cy="261610"/>
           </a:xfrm>
           <a:prstGeom prst="rect">
@@ -3440,7 +3401,7 @@
         </p:nvSpPr>
         <p:spPr bwMode="auto">
           <a:xfrm>
-            <a:off x="7260811" y="7591999"/>
+            <a:off x="7108411" y="7591999"/>
             <a:ext cx="1115904" cy="261610"/>
           </a:xfrm>
           <a:prstGeom prst="rect">
@@ -3601,7 +3562,7 @@
         </p:nvSpPr>
         <p:spPr bwMode="auto">
           <a:xfrm>
-            <a:off x="14814138" y="7002819"/>
+            <a:off x="13918788" y="7002819"/>
             <a:ext cx="1645920" cy="261610"/>
           </a:xfrm>
           <a:prstGeom prst="rect">
@@ -3762,7 +3723,7 @@
         </p:nvSpPr>
         <p:spPr bwMode="auto">
           <a:xfrm>
-            <a:off x="14813280" y="5753158"/>
+            <a:off x="13917930" y="5753158"/>
             <a:ext cx="1645920" cy="276999"/>
           </a:xfrm>
           <a:prstGeom prst="rect">
@@ -3923,7 +3884,7 @@
         </p:nvSpPr>
         <p:spPr bwMode="auto">
           <a:xfrm>
-            <a:off x="14813280" y="8586597"/>
+            <a:off x="13917930" y="8586597"/>
             <a:ext cx="1645920" cy="276999"/>
           </a:xfrm>
           <a:prstGeom prst="rect">
@@ -4063,7 +4024,7 @@
                 <a:ea typeface="Amazon Ember" panose="020B0603020204020204" pitchFamily="34" charset="0"/>
                 <a:cs typeface="Arial" panose="020B0604020202020204" pitchFamily="34" charset="0"/>
               </a:rPr>
-              <a:t>Amazon CloudWatch</a:t>
+              <a:t>CloudWatch</a:t>
             </a:r>
           </a:p>
         </p:txBody>
@@ -4084,7 +4045,7 @@
         </p:nvSpPr>
         <p:spPr bwMode="auto">
           <a:xfrm>
-            <a:off x="14813280" y="10234052"/>
+            <a:off x="13917930" y="10234052"/>
             <a:ext cx="1645920" cy="276999"/>
           </a:xfrm>
           <a:prstGeom prst="rect">
@@ -4245,7 +4206,7 @@
         </p:nvSpPr>
         <p:spPr bwMode="auto">
           <a:xfrm>
-            <a:off x="7904959" y="8778240"/>
+            <a:off x="7752559" y="8778240"/>
             <a:ext cx="1108760" cy="261610"/>
           </a:xfrm>
           <a:prstGeom prst="rect">
@@ -4406,7 +4367,7 @@
         </p:nvSpPr>
         <p:spPr bwMode="auto">
           <a:xfrm>
-            <a:off x="7903845" y="9966960"/>
+            <a:off x="7751445" y="9966960"/>
             <a:ext cx="1108760" cy="261610"/>
           </a:xfrm>
           <a:prstGeom prst="rect">
@@ -4567,7 +4528,7 @@
         </p:nvSpPr>
         <p:spPr bwMode="auto">
           <a:xfrm>
-            <a:off x="6767992" y="8780205"/>
+            <a:off x="6615592" y="8780205"/>
             <a:ext cx="1185862" cy="274320"/>
           </a:xfrm>
           <a:prstGeom prst="rect">
@@ -4728,7 +4689,7 @@
         </p:nvSpPr>
         <p:spPr bwMode="auto">
           <a:xfrm>
-            <a:off x="6762750" y="9969602"/>
+            <a:off x="6610350" y="9969602"/>
             <a:ext cx="1185862" cy="274320"/>
           </a:xfrm>
           <a:prstGeom prst="rect">
@@ -4889,7 +4850,7 @@
         </p:nvSpPr>
         <p:spPr bwMode="auto">
           <a:xfrm>
-            <a:off x="9555480" y="5852838"/>
+            <a:off x="9403080" y="5852838"/>
             <a:ext cx="1280160" cy="430887"/>
           </a:xfrm>
           <a:prstGeom prst="rect">
@@ -5078,7 +5039,7 @@
         </p:blipFill>
         <p:spPr bwMode="auto">
           <a:xfrm>
-            <a:off x="9966960" y="5393658"/>
+            <a:off x="9814560" y="5393658"/>
             <a:ext cx="457200" cy="457200"/>
           </a:xfrm>
           <a:prstGeom prst="rect">
@@ -5136,7 +5097,7 @@
         </p:blipFill>
         <p:spPr bwMode="auto">
           <a:xfrm>
-            <a:off x="7589520" y="7132320"/>
+            <a:off x="7437120" y="7132320"/>
             <a:ext cx="457200" cy="457200"/>
           </a:xfrm>
           <a:prstGeom prst="rect">
@@ -5196,7 +5157,7 @@
         </p:blipFill>
         <p:spPr bwMode="auto">
           <a:xfrm>
-            <a:off x="7132320" y="8321040"/>
+            <a:off x="6979920" y="8321040"/>
             <a:ext cx="457200" cy="457200"/>
           </a:xfrm>
           <a:prstGeom prst="rect">
@@ -5256,7 +5217,7 @@
         </p:blipFill>
         <p:spPr bwMode="auto">
           <a:xfrm>
-            <a:off x="7128143" y="9509760"/>
+            <a:off x="6975743" y="9509760"/>
             <a:ext cx="457200" cy="457200"/>
           </a:xfrm>
           <a:prstGeom prst="rect">
@@ -5316,7 +5277,7 @@
         </p:blipFill>
         <p:spPr bwMode="auto">
           <a:xfrm>
-            <a:off x="8229600" y="8321040"/>
+            <a:off x="8077200" y="8321040"/>
             <a:ext cx="457200" cy="457200"/>
           </a:xfrm>
           <a:prstGeom prst="rect">
@@ -5376,7 +5337,7 @@
         </p:blipFill>
         <p:spPr bwMode="auto">
           <a:xfrm>
-            <a:off x="8229600" y="9509760"/>
+            <a:off x="8077200" y="9509760"/>
             <a:ext cx="457200" cy="457200"/>
           </a:xfrm>
           <a:prstGeom prst="rect">
@@ -5436,7 +5397,7 @@
         </p:blipFill>
         <p:spPr bwMode="auto">
           <a:xfrm>
-            <a:off x="9965614" y="8319135"/>
+            <a:off x="9813214" y="8319135"/>
             <a:ext cx="457200" cy="457200"/>
           </a:xfrm>
           <a:prstGeom prst="rect">
@@ -5496,7 +5457,7 @@
         </p:blipFill>
         <p:spPr bwMode="auto">
           <a:xfrm>
-            <a:off x="9966960" y="9509760"/>
+            <a:off x="9814560" y="9509760"/>
             <a:ext cx="457200" cy="457200"/>
           </a:xfrm>
           <a:prstGeom prst="rect">
@@ -5556,7 +5517,7 @@
         </p:blipFill>
         <p:spPr bwMode="auto">
           <a:xfrm>
-            <a:off x="15261336" y="4988687"/>
+            <a:off x="14365986" y="4988687"/>
             <a:ext cx="762000" cy="762000"/>
           </a:xfrm>
           <a:prstGeom prst="rect">
@@ -5616,7 +5577,7 @@
         </p:blipFill>
         <p:spPr bwMode="auto">
           <a:xfrm>
-            <a:off x="15256584" y="7823327"/>
+            <a:off x="14361234" y="7823327"/>
             <a:ext cx="762000" cy="762000"/>
           </a:xfrm>
           <a:prstGeom prst="rect">
@@ -5676,7 +5637,7 @@
         </p:blipFill>
         <p:spPr bwMode="auto">
           <a:xfrm>
-            <a:off x="15255621" y="9469247"/>
+            <a:off x="14360271" y="9469247"/>
             <a:ext cx="762000" cy="762000"/>
           </a:xfrm>
           <a:prstGeom prst="rect">
@@ -5721,7 +5682,7 @@
         </p:nvSpPr>
         <p:spPr>
           <a:xfrm>
-            <a:off x="9326050" y="8778240"/>
+            <a:off x="9173650" y="8778240"/>
             <a:ext cx="1737360" cy="274320"/>
           </a:xfrm>
           <a:prstGeom prst="rect">
@@ -5760,7 +5721,7 @@
         </p:nvSpPr>
         <p:spPr>
           <a:xfrm>
-            <a:off x="9326880" y="9966960"/>
+            <a:off x="9174480" y="9966960"/>
             <a:ext cx="1737360" cy="274320"/>
           </a:xfrm>
           <a:prstGeom prst="rect">
@@ -5816,7 +5777,7 @@
         </p:blipFill>
         <p:spPr bwMode="auto">
           <a:xfrm>
-            <a:off x="15407640" y="6543167"/>
+            <a:off x="14512290" y="6543167"/>
             <a:ext cx="457200" cy="457200"/>
           </a:xfrm>
           <a:prstGeom prst="rect">
@@ -5862,7 +5823,7 @@
         <p:spPr bwMode="auto">
           <a:xfrm>
             <a:off x="4846319" y="3931920"/>
-            <a:ext cx="11704320" cy="7406640"/>
+            <a:ext cx="10603231" cy="7078980"/>
           </a:xfrm>
           <a:prstGeom prst="rect">
             <a:avLst/>
@@ -5947,10 +5908,10 @@
       </p:pic>
       <p:pic>
         <p:nvPicPr>
-          <p:cNvPr id="65" name="Graphic 10">
+          <p:cNvPr id="72" name="Graphic 35">
             <a:extLst>
               <a:ext uri="{FF2B5EF4-FFF2-40B4-BE49-F238E27FC236}">
-                <a16:creationId xmlns:a16="http://schemas.microsoft.com/office/drawing/2014/main" id="{41D0FB13-496D-4283-B839-A09A7C8723A7}"/>
+                <a16:creationId xmlns:a16="http://schemas.microsoft.com/office/drawing/2014/main" id="{273F5BD3-F565-4C93-B573-C85F6EBAEE3E}"/>
               </a:ext>
             </a:extLst>
           </p:cNvPr>
@@ -5974,51 +5935,7 @@
         </p:blipFill>
         <p:spPr bwMode="auto">
           <a:xfrm>
-            <a:off x="9966960" y="4346278"/>
-            <a:ext cx="457200" cy="457200"/>
-          </a:xfrm>
-          <a:prstGeom prst="rect">
-            <a:avLst/>
-          </a:prstGeom>
-          <a:solidFill>
-            <a:schemeClr val="bg1"/>
-          </a:solidFill>
-          <a:ln>
-            <a:noFill/>
-          </a:ln>
-          <a:extLst/>
-        </p:spPr>
-      </p:pic>
-      <p:pic>
-        <p:nvPicPr>
-          <p:cNvPr id="72" name="Graphic 35">
-            <a:extLst>
-              <a:ext uri="{FF2B5EF4-FFF2-40B4-BE49-F238E27FC236}">
-                <a16:creationId xmlns:a16="http://schemas.microsoft.com/office/drawing/2014/main" id="{273F5BD3-F565-4C93-B573-C85F6EBAEE3E}"/>
-              </a:ext>
-            </a:extLst>
-          </p:cNvPr>
-          <p:cNvPicPr>
-            <a:picLocks noChangeAspect="1" noChangeArrowheads="1"/>
-          </p:cNvPicPr>
-          <p:nvPr/>
-        </p:nvPicPr>
-        <p:blipFill>
-          <a:blip r:embed="rId21">
-            <a:extLst>
-              <a:ext uri="{28A0092B-C50C-407E-A947-70E740481C1C}">
-                <a14:useLocalDpi xmlns:a14="http://schemas.microsoft.com/office/drawing/2010/main" val="0"/>
-              </a:ext>
-            </a:extLst>
-          </a:blip>
-          <a:srcRect/>
-          <a:stretch>
-            <a:fillRect/>
-          </a:stretch>
-        </p:blipFill>
-        <p:spPr bwMode="auto">
-          <a:xfrm>
-            <a:off x="7589520" y="5303520"/>
+            <a:off x="7437120" y="5303520"/>
             <a:ext cx="457200" cy="457200"/>
           </a:xfrm>
           <a:prstGeom prst="rect">
@@ -6063,7 +5980,7 @@
         </p:nvSpPr>
         <p:spPr>
           <a:xfrm>
-            <a:off x="6858000" y="6949440"/>
+            <a:off x="6705600" y="6946716"/>
             <a:ext cx="6675120" cy="914400"/>
           </a:xfrm>
           <a:prstGeom prst="rect">
@@ -6170,10 +6087,10 @@
           <p:nvPr/>
         </p:nvPicPr>
         <p:blipFill>
-          <a:blip r:embed="rId22">
+          <a:blip r:embed="rId21">
             <a:extLst>
               <a:ext uri="{96DAC541-7B7A-43D3-8B79-37D633B846F1}">
-                <asvg:svgBlip xmlns:asvg="http://schemas.microsoft.com/office/drawing/2016/SVG/main" r:embed="rId23"/>
+                <asvg:svgBlip xmlns:asvg="http://schemas.microsoft.com/office/drawing/2016/SVG/main" r:embed="rId22"/>
               </a:ext>
             </a:extLst>
           </a:blip>
@@ -6183,7 +6100,7 @@
         </p:blipFill>
         <p:spPr>
           <a:xfrm>
-            <a:off x="9958482" y="6946716"/>
+            <a:off x="9806082" y="6946716"/>
             <a:ext cx="381000" cy="381000"/>
           </a:xfrm>
           <a:prstGeom prst="rect">
@@ -6205,7 +6122,7 @@
         </p:nvSpPr>
         <p:spPr>
           <a:xfrm>
-            <a:off x="6858000" y="8138160"/>
+            <a:off x="6705600" y="8138160"/>
             <a:ext cx="6675120" cy="914400"/>
           </a:xfrm>
           <a:prstGeom prst="rect">
@@ -6290,7 +6207,7 @@
         </p:nvSpPr>
         <p:spPr>
           <a:xfrm>
-            <a:off x="6858000" y="9327356"/>
+            <a:off x="6705600" y="9327356"/>
             <a:ext cx="6675120" cy="914400"/>
           </a:xfrm>
           <a:prstGeom prst="rect">
@@ -6357,8 +6274,8 @@
         </p:nvSpPr>
         <p:spPr>
           <a:xfrm>
-            <a:off x="11064240" y="4206240"/>
-            <a:ext cx="3017520" cy="6858000"/>
+            <a:off x="11013510" y="4206240"/>
+            <a:ext cx="2809551" cy="6614160"/>
           </a:xfrm>
           <a:prstGeom prst="rect">
             <a:avLst/>
@@ -6428,7 +6345,7 @@
         </p:nvSpPr>
         <p:spPr>
           <a:xfrm>
-            <a:off x="11338560" y="4846320"/>
+            <a:off x="11186160" y="4846320"/>
             <a:ext cx="2468880" cy="1337999"/>
           </a:xfrm>
           <a:prstGeom prst="rect">
@@ -6508,7 +6425,7 @@
         </p:blipFill>
         <p:spPr>
           <a:xfrm>
-            <a:off x="11338560" y="4846320"/>
+            <a:off x="11186160" y="4846320"/>
             <a:ext cx="381000" cy="381000"/>
           </a:xfrm>
           <a:prstGeom prst="rect">
@@ -6530,7 +6447,7 @@
         </p:nvSpPr>
         <p:spPr>
           <a:xfrm>
-            <a:off x="11338560" y="6492240"/>
+            <a:off x="11186160" y="6492240"/>
             <a:ext cx="2468880" cy="4023360"/>
           </a:xfrm>
           <a:prstGeom prst="rect">
@@ -6610,7 +6527,7 @@
         </p:blipFill>
         <p:spPr>
           <a:xfrm>
-            <a:off x="11338560" y="6492240"/>
+            <a:off x="11186160" y="6492240"/>
             <a:ext cx="381000" cy="381000"/>
           </a:xfrm>
           <a:prstGeom prst="rect">
@@ -6632,7 +6549,7 @@
         </p:nvSpPr>
         <p:spPr>
           <a:xfrm>
-            <a:off x="11705408" y="5808202"/>
+            <a:off x="11553008" y="5808202"/>
             <a:ext cx="1769070" cy="261610"/>
           </a:xfrm>
           <a:prstGeom prst="rect">
@@ -6673,7 +6590,7 @@
         </p:nvSpPr>
         <p:spPr bwMode="auto">
           <a:xfrm>
-            <a:off x="12017505" y="7589520"/>
+            <a:off x="11865105" y="7589520"/>
             <a:ext cx="1115904" cy="261610"/>
           </a:xfrm>
           <a:prstGeom prst="rect">
@@ -6834,7 +6751,7 @@
         </p:nvSpPr>
         <p:spPr bwMode="auto">
           <a:xfrm>
-            <a:off x="12663558" y="8778240"/>
+            <a:off x="12511158" y="8778240"/>
             <a:ext cx="1097280" cy="274320"/>
           </a:xfrm>
           <a:prstGeom prst="rect">
@@ -6995,7 +6912,7 @@
         </p:nvSpPr>
         <p:spPr bwMode="auto">
           <a:xfrm>
-            <a:off x="12664440" y="9966960"/>
+            <a:off x="12512040" y="9966960"/>
             <a:ext cx="1097280" cy="274320"/>
           </a:xfrm>
           <a:prstGeom prst="rect">
@@ -7156,7 +7073,7 @@
         </p:nvSpPr>
         <p:spPr bwMode="auto">
           <a:xfrm>
-            <a:off x="11524686" y="8778240"/>
+            <a:off x="11372286" y="8778240"/>
             <a:ext cx="1185862" cy="274320"/>
           </a:xfrm>
           <a:prstGeom prst="rect">
@@ -7317,7 +7234,7 @@
         </p:nvSpPr>
         <p:spPr bwMode="auto">
           <a:xfrm>
-            <a:off x="11521440" y="9966960"/>
+            <a:off x="11369040" y="9966960"/>
             <a:ext cx="1185862" cy="261610"/>
           </a:xfrm>
           <a:prstGeom prst="rect">
@@ -7489,7 +7406,7 @@
         </p:blipFill>
         <p:spPr bwMode="auto">
           <a:xfrm>
-            <a:off x="12344400" y="7132320"/>
+            <a:off x="12192000" y="7132320"/>
             <a:ext cx="457200" cy="457200"/>
           </a:xfrm>
           <a:prstGeom prst="rect">
@@ -7549,7 +7466,7 @@
         </p:blipFill>
         <p:spPr bwMode="auto">
           <a:xfrm>
-            <a:off x="11885204" y="8321040"/>
+            <a:off x="11732804" y="8321040"/>
             <a:ext cx="457200" cy="457200"/>
           </a:xfrm>
           <a:prstGeom prst="rect">
@@ -7609,7 +7526,7 @@
         </p:blipFill>
         <p:spPr bwMode="auto">
           <a:xfrm>
-            <a:off x="11888647" y="9509760"/>
+            <a:off x="11736247" y="9509760"/>
             <a:ext cx="457200" cy="457200"/>
           </a:xfrm>
           <a:prstGeom prst="rect">
@@ -7669,7 +7586,7 @@
         </p:blipFill>
         <p:spPr bwMode="auto">
           <a:xfrm>
-            <a:off x="12982484" y="8321040"/>
+            <a:off x="12830084" y="8321040"/>
             <a:ext cx="457200" cy="457200"/>
           </a:xfrm>
           <a:prstGeom prst="rect">
@@ -7729,7 +7646,7 @@
         </p:blipFill>
         <p:spPr bwMode="auto">
           <a:xfrm>
-            <a:off x="12982484" y="9509760"/>
+            <a:off x="12830084" y="9509760"/>
             <a:ext cx="457200" cy="457200"/>
           </a:xfrm>
           <a:prstGeom prst="rect">
@@ -7775,7 +7692,7 @@
           <p:nvPr/>
         </p:nvPicPr>
         <p:blipFill>
-          <a:blip r:embed="rId21">
+          <a:blip r:embed="rId20">
             <a:extLst>
               <a:ext uri="{28A0092B-C50C-407E-A947-70E740481C1C}">
                 <a14:useLocalDpi xmlns:a14="http://schemas.microsoft.com/office/drawing/2010/main" val="0"/>
@@ -7789,7 +7706,7 @@
         </p:blipFill>
         <p:spPr bwMode="auto">
           <a:xfrm>
-            <a:off x="12344400" y="5303520"/>
+            <a:off x="12192000" y="5303520"/>
             <a:ext cx="457200" cy="457200"/>
           </a:xfrm>
           <a:prstGeom prst="rect">

</xml_diff>